<commit_message>
Amir Khusnutdinov sound and choose level version
</commit_message>
<xml_diff>
--- a/ТАНЧИКИ НА pYGAME.pptx
+++ b/ТАНЧИКИ НА pYGAME.pptx
@@ -107,6 +107,11 @@
       </a:defRPr>
     </a:lvl9pPr>
   </p:defaultTextStyle>
+  <p:extLst>
+    <p:ext uri="{EFAFB233-063F-42B5-8137-9DF3F51BA10A}">
+      <p15:sldGuideLst xmlns:p15="http://schemas.microsoft.com/office/powerpoint/2012/main"/>
+    </p:ext>
+  </p:extLst>
 </p:presentation>
 </file>
 
@@ -8903,7 +8908,7 @@
           <a:p>
             <a:fld id="{6AD6EE87-EBD5-4F12-A48A-63ACA297AC8F}" type="datetimeFigureOut">
               <a:rPr lang="en-US" dirty="0"/>
-              <a:t>2/3/2023</a:t>
+              <a:t>2/5/2023</a:t>
             </a:fld>
             <a:endParaRPr lang="en-US" dirty="0"/>
           </a:p>
@@ -9105,7 +9110,7 @@
           <a:p>
             <a:fld id="{4CD73815-2707-4475-8F1A-B873CB631BB4}" type="datetimeFigureOut">
               <a:rPr lang="en-US" dirty="0"/>
-              <a:t>2/3/2023</a:t>
+              <a:t>2/5/2023</a:t>
             </a:fld>
             <a:endParaRPr lang="en-US" dirty="0"/>
           </a:p>
@@ -9280,7 +9285,7 @@
           <a:p>
             <a:fld id="{2A4AFB99-0EAB-4182-AFF8-E214C82A68F6}" type="datetimeFigureOut">
               <a:rPr lang="en-US" dirty="0"/>
-              <a:t>2/3/2023</a:t>
+              <a:t>2/5/2023</a:t>
             </a:fld>
             <a:endParaRPr lang="en-US" dirty="0"/>
           </a:p>
@@ -9480,7 +9485,7 @@
           <a:p>
             <a:fld id="{A5D3794B-289A-4A80-97D7-111025398D45}" type="datetimeFigureOut">
               <a:rPr lang="en-US" dirty="0"/>
-              <a:t>2/3/2023</a:t>
+              <a:t>2/5/2023</a:t>
             </a:fld>
             <a:endParaRPr lang="en-US" dirty="0"/>
           </a:p>
@@ -18373,7 +18378,7 @@
           <a:p>
             <a:fld id="{5A61015F-7CC6-4D0A-9D87-873EA4C304CC}" type="datetimeFigureOut">
               <a:rPr lang="en-US" dirty="0"/>
-              <a:t>2/3/2023</a:t>
+              <a:t>2/5/2023</a:t>
             </a:fld>
             <a:endParaRPr lang="en-US" dirty="0"/>
           </a:p>
@@ -18642,7 +18647,7 @@
           <a:p>
             <a:fld id="{93C6A301-0538-44EC-B09D-202E1042A48B}" type="datetimeFigureOut">
               <a:rPr lang="en-US" dirty="0"/>
-              <a:t>2/3/2023</a:t>
+              <a:t>2/5/2023</a:t>
             </a:fld>
             <a:endParaRPr lang="en-US" dirty="0"/>
           </a:p>
@@ -19035,7 +19040,7 @@
           <a:p>
             <a:fld id="{D789574A-8875-45EF-8EA2-3CAA0F7ABC4C}" type="datetimeFigureOut">
               <a:rPr lang="en-US" dirty="0"/>
-              <a:t>2/3/2023</a:t>
+              <a:t>2/5/2023</a:t>
             </a:fld>
             <a:endParaRPr lang="en-US" dirty="0"/>
           </a:p>
@@ -19148,7 +19153,7 @@
           <a:p>
             <a:fld id="{67EF4D4C-5367-4C26-9E2B-D8088D7FCA81}" type="datetimeFigureOut">
               <a:rPr lang="en-US" dirty="0"/>
-              <a:t>2/3/2023</a:t>
+              <a:t>2/5/2023</a:t>
             </a:fld>
             <a:endParaRPr lang="en-US" dirty="0"/>
           </a:p>
@@ -19238,7 +19243,7 @@
           <a:p>
             <a:fld id="{56E91E96-98B0-4413-9547-46F3504108EF}" type="datetimeFigureOut">
               <a:rPr lang="en-US" dirty="0"/>
-              <a:t>2/3/2023</a:t>
+              <a:t>2/5/2023</a:t>
             </a:fld>
             <a:endParaRPr lang="en-US" dirty="0"/>
           </a:p>
@@ -19523,7 +19528,7 @@
           <a:p>
             <a:fld id="{05C68B11-C5A8-448C-8CE9-B1A273C79CFC}" type="datetimeFigureOut">
               <a:rPr lang="en-US" dirty="0"/>
-              <a:t>2/3/2023</a:t>
+              <a:t>2/5/2023</a:t>
             </a:fld>
             <a:endParaRPr lang="en-US" dirty="0"/>
           </a:p>
@@ -19798,7 +19803,7 @@
           <a:p>
             <a:fld id="{C7616CA0-919D-4A49-9C8A-62FDFB3A5183}" type="datetimeFigureOut">
               <a:rPr lang="en-US" dirty="0"/>
-              <a:t>2/3/2023</a:t>
+              <a:t>2/5/2023</a:t>
             </a:fld>
             <a:endParaRPr lang="en-US" dirty="0"/>
           </a:p>
@@ -20044,7 +20049,7 @@
             <a:fld id="{90298CD5-6C1E-4009-B41F-6DF62E31D3BE}" type="datetimeFigureOut">
               <a:rPr lang="en-US" dirty="0"/>
               <a:pPr/>
-              <a:t>2/3/2023</a:t>
+              <a:t>2/5/2023</a:t>
             </a:fld>
             <a:endParaRPr lang="en-US" dirty="0"/>
           </a:p>
@@ -20610,6 +20615,13 @@
   <p:clrMapOvr>
     <a:masterClrMapping/>
   </p:clrMapOvr>
+  <p:timing>
+    <p:tnLst>
+      <p:par>
+        <p:cTn id="1" dur="indefinite" restart="never" nodeType="tmRoot"/>
+      </p:par>
+    </p:tnLst>
+  </p:timing>
 </p:sld>
 </file>
 
@@ -20702,8 +20714,13 @@
           <a:p>
             <a:r>
               <a:rPr lang="ru-RU" dirty="0" smtClean="0"/>
-              <a:t>4) Изменять звук игры и прописать КД каждого игрока</a:t>
+              <a:t>4) Изменять звук </a:t>
             </a:r>
+            <a:r>
+              <a:rPr lang="ru-RU" dirty="0" smtClean="0"/>
+              <a:t>игры</a:t>
+            </a:r>
+            <a:endParaRPr lang="ru-RU" dirty="0" smtClean="0"/>
           </a:p>
           <a:p>
             <a:r>
@@ -20714,7 +20731,11 @@
           <a:p>
             <a:r>
               <a:rPr lang="ru-RU" dirty="0" smtClean="0"/>
-              <a:t>6)Отображать правила </a:t>
+              <a:t>6)Отображать </a:t>
+            </a:r>
+            <a:r>
+              <a:rPr lang="ru-RU" dirty="0" smtClean="0"/>
+              <a:t>управление игры</a:t>
             </a:r>
             <a:endParaRPr lang="ru-RU" dirty="0"/>
           </a:p>
@@ -20915,7 +20936,23 @@
             </a:r>
             <a:r>
               <a:rPr lang="en-US" dirty="0" smtClean="0"/>
-              <a:t>, Random</a:t>
+              <a:t>, </a:t>
+            </a:r>
+            <a:r>
+              <a:rPr lang="en-US" dirty="0" smtClean="0"/>
+              <a:t>Random</a:t>
+            </a:r>
+            <a:r>
+              <a:rPr lang="ru-RU" dirty="0" smtClean="0"/>
+              <a:t>, </a:t>
+            </a:r>
+            <a:r>
+              <a:rPr lang="en-US" dirty="0" smtClean="0"/>
+              <a:t>Sys, </a:t>
+            </a:r>
+            <a:r>
+              <a:rPr lang="en-US" dirty="0" err="1" smtClean="0"/>
+              <a:t>Os</a:t>
             </a:r>
             <a:endParaRPr lang="ru-RU" dirty="0" smtClean="0"/>
           </a:p>
@@ -20955,43 +20992,45 @@
               <a:t>Main, map, </a:t>
             </a:r>
             <a:r>
-              <a:rPr lang="en-US" dirty="0" err="1" smtClean="0"/>
-              <a:t>start_page</a:t>
+              <a:rPr lang="en-US" dirty="0" smtClean="0"/>
+              <a:t>start page</a:t>
             </a:r>
             <a:r>
               <a:rPr lang="en-US" dirty="0" smtClean="0"/>
               <a:t>, sprites, </a:t>
             </a:r>
             <a:r>
-              <a:rPr lang="en-US" dirty="0" err="1" smtClean="0"/>
-              <a:t>win_or_lose</a:t>
+              <a:rPr lang="en-US" dirty="0" smtClean="0"/>
+              <a:t>win or lose </a:t>
             </a:r>
             <a:r>
-              <a:rPr lang="en-US" dirty="0"/>
-              <a:t> </a:t>
-            </a:r>
-            <a:r>
-              <a:rPr lang="ru-RU" dirty="0"/>
-              <a:t> </a:t>
+              <a:rPr lang="ru-RU" dirty="0" smtClean="0"/>
+              <a:t>  </a:t>
             </a:r>
             <a:r>
               <a:rPr lang="en-US" dirty="0" smtClean="0"/>
-              <a:t>.</a:t>
-            </a:r>
-            <a:r>
-              <a:rPr lang="en-US" dirty="0" err="1" smtClean="0"/>
-              <a:t>py</a:t>
+              <a:t>PY </a:t>
             </a:r>
             <a:r>
               <a:rPr lang="ru-RU" dirty="0" smtClean="0"/>
-              <a:t> файлы</a:t>
+              <a:t>файлы</a:t>
             </a:r>
+            <a:endParaRPr lang="ru-RU" dirty="0" smtClean="0"/>
           </a:p>
           <a:p>
             <a:r>
               <a:rPr lang="ru-RU" dirty="0" smtClean="0"/>
-              <a:t>А так же различные папки с изображениями и музыкой</a:t>
+              <a:t>А так же различные папки с изображениями и </a:t>
             </a:r>
+            <a:r>
+              <a:rPr lang="ru-RU" dirty="0" smtClean="0"/>
+              <a:t>музыкой</a:t>
+            </a:r>
+            <a:r>
+              <a:rPr lang="en-US" dirty="0" smtClean="0"/>
+              <a:t> </a:t>
+            </a:r>
+            <a:endParaRPr lang="ru-RU" dirty="0" smtClean="0"/>
           </a:p>
           <a:p>
             <a:endParaRPr lang="en-US" dirty="0" smtClean="0"/>
@@ -21014,6 +21053,13 @@
   <p:clrMapOvr>
     <a:masterClrMapping/>
   </p:clrMapOvr>
+  <p:timing>
+    <p:tnLst>
+      <p:par>
+        <p:cTn id="1" dur="indefinite" restart="never" nodeType="tmRoot"/>
+      </p:par>
+    </p:tnLst>
+  </p:timing>
 </p:sld>
 </file>
 
@@ -21072,17 +21118,37 @@
           <a:bodyPr/>
           <a:lstStyle/>
           <a:p>
+            <a:pPr marL="0" indent="0">
+              <a:buNone/>
+            </a:pPr>
             <a:r>
               <a:rPr lang="ru-RU" dirty="0" smtClean="0"/>
-              <a:t>Проект вышел не плохим но нуждается в наличие бонусов в игре а так же некоторых игровых механик которые </a:t>
+              <a:t>Проект частично повторяет основные элементы игры</a:t>
             </a:r>
             <a:r>
-              <a:rPr lang="ru-RU" smtClean="0"/>
-              <a:t>будут реализованы </a:t>
+              <a:rPr lang="en-US" dirty="0" smtClean="0"/>
+              <a:t> Battle city </a:t>
             </a:r>
             <a:r>
               <a:rPr lang="ru-RU" dirty="0" smtClean="0"/>
-              <a:t>в ближайшее время и сданы вместе с проектом</a:t>
+              <a:t>но не лишён индивидуальности, а именно в нем присутствует измененная графика, карты и музыкальные эффекты.</a:t>
+            </a:r>
+          </a:p>
+          <a:p>
+            <a:pPr marL="0" indent="0">
+              <a:buNone/>
+            </a:pPr>
+            <a:r>
+              <a:rPr lang="ru-RU" dirty="0" smtClean="0"/>
+              <a:t>Но несмотря на все это в будущем можно реализовать различные </a:t>
+            </a:r>
+            <a:r>
+              <a:rPr lang="ru-RU" dirty="0" err="1" smtClean="0"/>
+              <a:t>скины</a:t>
+            </a:r>
+            <a:r>
+              <a:rPr lang="ru-RU" dirty="0" smtClean="0"/>
+              <a:t> на танки, различные новые карты и механики</a:t>
             </a:r>
             <a:endParaRPr lang="ru-RU" dirty="0"/>
           </a:p>
@@ -21098,6 +21164,13 @@
   <p:clrMapOvr>
     <a:masterClrMapping/>
   </p:clrMapOvr>
+  <p:timing>
+    <p:tnLst>
+      <p:par>
+        <p:cTn id="1" dur="indefinite" restart="never" nodeType="tmRoot"/>
+      </p:par>
+    </p:tnLst>
+  </p:timing>
 </p:sld>
 </file>
 

</xml_diff>